<commit_message>
Updated files and added system design image
</commit_message>
<xml_diff>
--- a/Project Slides.pptx
+++ b/Project Slides.pptx
@@ -618,7 +618,7 @@
           <a:p>
             <a:fld id="{2E3F47AE-4804-4655-8D11-C2BEE1A314EC}" type="datetimeFigureOut">
               <a:rPr lang="en-GB" smtClean="0"/>
-              <a:t>06/02/2022</a:t>
+              <a:t>10/04/2022</a:t>
             </a:fld>
             <a:endParaRPr lang="en-GB"/>
           </a:p>
@@ -914,7 +914,7 @@
           <a:p>
             <a:fld id="{2E3F47AE-4804-4655-8D11-C2BEE1A314EC}" type="datetimeFigureOut">
               <a:rPr lang="en-GB" smtClean="0"/>
-              <a:t>06/02/2022</a:t>
+              <a:t>10/04/2022</a:t>
             </a:fld>
             <a:endParaRPr lang="en-GB"/>
           </a:p>
@@ -1162,7 +1162,7 @@
           <a:p>
             <a:fld id="{2E3F47AE-4804-4655-8D11-C2BEE1A314EC}" type="datetimeFigureOut">
               <a:rPr lang="en-GB" smtClean="0"/>
-              <a:t>06/02/2022</a:t>
+              <a:t>10/04/2022</a:t>
             </a:fld>
             <a:endParaRPr lang="en-GB"/>
           </a:p>
@@ -1702,7 +1702,7 @@
           <a:p>
             <a:fld id="{2E3F47AE-4804-4655-8D11-C2BEE1A314EC}" type="datetimeFigureOut">
               <a:rPr lang="en-GB" smtClean="0"/>
-              <a:t>06/02/2022</a:t>
+              <a:t>10/04/2022</a:t>
             </a:fld>
             <a:endParaRPr lang="en-GB"/>
           </a:p>
@@ -1950,7 +1950,7 @@
           <a:p>
             <a:fld id="{2E3F47AE-4804-4655-8D11-C2BEE1A314EC}" type="datetimeFigureOut">
               <a:rPr lang="en-GB" smtClean="0"/>
-              <a:t>06/02/2022</a:t>
+              <a:t>10/04/2022</a:t>
             </a:fld>
             <a:endParaRPr lang="en-GB"/>
           </a:p>
@@ -2482,7 +2482,7 @@
           <a:p>
             <a:fld id="{2E3F47AE-4804-4655-8D11-C2BEE1A314EC}" type="datetimeFigureOut">
               <a:rPr lang="en-GB" smtClean="0"/>
-              <a:t>06/02/2022</a:t>
+              <a:t>10/04/2022</a:t>
             </a:fld>
             <a:endParaRPr lang="en-GB"/>
           </a:p>
@@ -2779,7 +2779,7 @@
           <a:p>
             <a:fld id="{2E3F47AE-4804-4655-8D11-C2BEE1A314EC}" type="datetimeFigureOut">
               <a:rPr lang="en-GB" smtClean="0"/>
-              <a:t>06/02/2022</a:t>
+              <a:t>10/04/2022</a:t>
             </a:fld>
             <a:endParaRPr lang="en-GB"/>
           </a:p>
@@ -2953,7 +2953,7 @@
           <a:p>
             <a:fld id="{2E3F47AE-4804-4655-8D11-C2BEE1A314EC}" type="datetimeFigureOut">
               <a:rPr lang="en-GB" smtClean="0"/>
-              <a:t>06/02/2022</a:t>
+              <a:t>10/04/2022</a:t>
             </a:fld>
             <a:endParaRPr lang="en-GB"/>
           </a:p>
@@ -3133,7 +3133,7 @@
           <a:p>
             <a:fld id="{2E3F47AE-4804-4655-8D11-C2BEE1A314EC}" type="datetimeFigureOut">
               <a:rPr lang="en-GB" smtClean="0"/>
-              <a:t>06/02/2022</a:t>
+              <a:t>10/04/2022</a:t>
             </a:fld>
             <a:endParaRPr lang="en-GB"/>
           </a:p>
@@ -3303,7 +3303,7 @@
           <a:p>
             <a:fld id="{2E3F47AE-4804-4655-8D11-C2BEE1A314EC}" type="datetimeFigureOut">
               <a:rPr lang="en-GB" smtClean="0"/>
-              <a:t>06/02/2022</a:t>
+              <a:t>10/04/2022</a:t>
             </a:fld>
             <a:endParaRPr lang="en-GB"/>
           </a:p>
@@ -3554,7 +3554,7 @@
           <a:p>
             <a:fld id="{2E3F47AE-4804-4655-8D11-C2BEE1A314EC}" type="datetimeFigureOut">
               <a:rPr lang="en-GB" smtClean="0"/>
-              <a:t>06/02/2022</a:t>
+              <a:t>10/04/2022</a:t>
             </a:fld>
             <a:endParaRPr lang="en-GB"/>
           </a:p>
@@ -3851,7 +3851,7 @@
           <a:p>
             <a:fld id="{2E3F47AE-4804-4655-8D11-C2BEE1A314EC}" type="datetimeFigureOut">
               <a:rPr lang="en-GB" smtClean="0"/>
-              <a:t>06/02/2022</a:t>
+              <a:t>10/04/2022</a:t>
             </a:fld>
             <a:endParaRPr lang="en-GB"/>
           </a:p>
@@ -4293,7 +4293,7 @@
           <a:p>
             <a:fld id="{2E3F47AE-4804-4655-8D11-C2BEE1A314EC}" type="datetimeFigureOut">
               <a:rPr lang="en-GB" smtClean="0"/>
-              <a:t>06/02/2022</a:t>
+              <a:t>10/04/2022</a:t>
             </a:fld>
             <a:endParaRPr lang="en-GB"/>
           </a:p>
@@ -4411,7 +4411,7 @@
           <a:p>
             <a:fld id="{2E3F47AE-4804-4655-8D11-C2BEE1A314EC}" type="datetimeFigureOut">
               <a:rPr lang="en-GB" smtClean="0"/>
-              <a:t>06/02/2022</a:t>
+              <a:t>10/04/2022</a:t>
             </a:fld>
             <a:endParaRPr lang="en-GB"/>
           </a:p>
@@ -4506,7 +4506,7 @@
           <a:p>
             <a:fld id="{2E3F47AE-4804-4655-8D11-C2BEE1A314EC}" type="datetimeFigureOut">
               <a:rPr lang="en-GB" smtClean="0"/>
-              <a:t>06/02/2022</a:t>
+              <a:t>10/04/2022</a:t>
             </a:fld>
             <a:endParaRPr lang="en-GB"/>
           </a:p>
@@ -4789,7 +4789,7 @@
           <a:p>
             <a:fld id="{2E3F47AE-4804-4655-8D11-C2BEE1A314EC}" type="datetimeFigureOut">
               <a:rPr lang="en-GB" smtClean="0"/>
-              <a:t>06/02/2022</a:t>
+              <a:t>10/04/2022</a:t>
             </a:fld>
             <a:endParaRPr lang="en-GB"/>
           </a:p>
@@ -5080,7 +5080,7 @@
           <a:p>
             <a:fld id="{2E3F47AE-4804-4655-8D11-C2BEE1A314EC}" type="datetimeFigureOut">
               <a:rPr lang="en-GB" smtClean="0"/>
-              <a:t>06/02/2022</a:t>
+              <a:t>10/04/2022</a:t>
             </a:fld>
             <a:endParaRPr lang="en-GB"/>
           </a:p>
@@ -5610,7 +5610,7 @@
           <a:p>
             <a:fld id="{2E3F47AE-4804-4655-8D11-C2BEE1A314EC}" type="datetimeFigureOut">
               <a:rPr lang="en-GB" smtClean="0"/>
-              <a:t>06/02/2022</a:t>
+              <a:t>10/04/2022</a:t>
             </a:fld>
             <a:endParaRPr lang="en-GB"/>
           </a:p>
@@ -11426,7 +11426,7 @@
         </p:spPr>
         <p:txBody>
           <a:bodyPr vert="horz" lIns="91440" tIns="45720" rIns="91440" bIns="45720" rtlCol="0" anchor="ctr">
-            <a:normAutofit fontScale="92500" lnSpcReduction="20000"/>
+            <a:normAutofit fontScale="77500" lnSpcReduction="20000"/>
           </a:bodyPr>
           <a:lstStyle/>
           <a:p>
@@ -11456,7 +11456,17 @@
             </a:pPr>
             <a:r>
               <a:rPr lang="en-US" sz="1900" dirty="0"/>
-              <a:t> Gant Chart</a:t>
+              <a:t> Project Planner</a:t>
+            </a:r>
+          </a:p>
+          <a:p>
+            <a:pPr lvl="2" algn="l">
+              <a:buFont typeface="Arial"/>
+              <a:buChar char="•"/>
+            </a:pPr>
+            <a:r>
+              <a:rPr lang="en-US" sz="1700" dirty="0"/>
+              <a:t>Word document with weekly tasks</a:t>
             </a:r>
           </a:p>
           <a:p>
@@ -11466,7 +11476,7 @@
             </a:pPr>
             <a:r>
               <a:rPr lang="en-US" sz="1900" dirty="0"/>
-              <a:t>Word document with weekly tasks</a:t>
+              <a:t>Weekly Meetings</a:t>
             </a:r>
           </a:p>
           <a:p>
@@ -11927,7 +11937,7 @@
         </p:blipFill>
         <p:spPr>
           <a:xfrm>
-            <a:off x="934465" y="3371955"/>
+            <a:off x="883724" y="3680813"/>
             <a:ext cx="5642160" cy="2412806"/>
           </a:xfrm>
           <a:prstGeom prst="roundRect">
@@ -11950,10 +11960,10 @@
       </p:pic>
       <p:pic>
         <p:nvPicPr>
-          <p:cNvPr id="6" name="Picture 5">
+          <p:cNvPr id="7" name="Picture 6">
             <a:extLst>
               <a:ext uri="{FF2B5EF4-FFF2-40B4-BE49-F238E27FC236}">
-                <a16:creationId xmlns:a16="http://schemas.microsoft.com/office/drawing/2014/main" id="{EAA827E7-F372-4B4E-9231-C44256031BA0}"/>
+                <a16:creationId xmlns:a16="http://schemas.microsoft.com/office/drawing/2014/main" id="{3B3B0845-0917-4B9A-9A2E-6A6A4DFE5AA2}"/>
               </a:ext>
             </a:extLst>
           </p:cNvPr>
@@ -11970,25 +11980,12 @@
         </p:blipFill>
         <p:spPr>
           <a:xfrm>
-            <a:off x="3031875" y="1092011"/>
-            <a:ext cx="4197844" cy="1397587"/>
+            <a:off x="3661236" y="98941"/>
+            <a:ext cx="3161965" cy="3330059"/>
           </a:xfrm>
-          <a:prstGeom prst="roundRect">
-            <a:avLst>
-              <a:gd name="adj" fmla="val 8594"/>
-            </a:avLst>
+          <a:prstGeom prst="rect">
+            <a:avLst/>
           </a:prstGeom>
-          <a:solidFill>
-            <a:srgbClr val="FFFFFF">
-              <a:shade val="85000"/>
-            </a:srgbClr>
-          </a:solidFill>
-          <a:ln>
-            <a:noFill/>
-          </a:ln>
-          <a:effectLst>
-            <a:reflection blurRad="12700" stA="38000" endPos="28000" dist="5000" dir="5400000" sy="-100000" algn="bl" rotWithShape="0"/>
-          </a:effectLst>
         </p:spPr>
       </p:pic>
     </p:spTree>
@@ -13575,10 +13572,10 @@
       </p:sp>
       <p:pic>
         <p:nvPicPr>
-          <p:cNvPr id="21" name="Picture 20">
+          <p:cNvPr id="5" name="Picture 4" descr="Graphical user interface, application&#10;&#10;Description automatically generated">
             <a:extLst>
               <a:ext uri="{FF2B5EF4-FFF2-40B4-BE49-F238E27FC236}">
-                <a16:creationId xmlns:a16="http://schemas.microsoft.com/office/drawing/2014/main" id="{533B730C-B6FF-4E45-B88D-5E9D342AE614}"/>
+                <a16:creationId xmlns:a16="http://schemas.microsoft.com/office/drawing/2014/main" id="{14C59151-F5CC-47B1-A88E-26DECD120321}"/>
               </a:ext>
             </a:extLst>
           </p:cNvPr>
@@ -13588,32 +13585,55 @@
           <p:nvPr/>
         </p:nvPicPr>
         <p:blipFill>
-          <a:blip r:embed="rId2"/>
+          <a:blip r:embed="rId2">
+            <a:extLst>
+              <a:ext uri="{28A0092B-C50C-407E-A947-70E740481C1C}">
+                <a14:useLocalDpi xmlns:a14="http://schemas.microsoft.com/office/drawing/2010/main" val="0"/>
+              </a:ext>
+            </a:extLst>
+          </a:blip>
           <a:stretch>
             <a:fillRect/>
           </a:stretch>
         </p:blipFill>
         <p:spPr>
           <a:xfrm>
-            <a:off x="607604" y="1749214"/>
-            <a:ext cx="6177169" cy="3665572"/>
+            <a:off x="1056324" y="1635393"/>
+            <a:ext cx="5362935" cy="4800530"/>
           </a:xfrm>
-          <a:prstGeom prst="roundRect">
-            <a:avLst>
-              <a:gd name="adj" fmla="val 8594"/>
-            </a:avLst>
+          <a:prstGeom prst="rect">
+            <a:avLst/>
           </a:prstGeom>
           <a:solidFill>
             <a:srgbClr val="FFFFFF">
               <a:shade val="85000"/>
             </a:srgbClr>
           </a:solidFill>
-          <a:ln>
-            <a:noFill/>
+          <a:ln w="88900" cap="sq">
+            <a:solidFill>
+              <a:srgbClr val="FFFFFF"/>
+            </a:solidFill>
+            <a:miter lim="800000"/>
           </a:ln>
           <a:effectLst>
-            <a:reflection blurRad="12700" stA="38000" endPos="28000" dist="5000" dir="5400000" sy="-100000" algn="bl" rotWithShape="0"/>
+            <a:outerShdw blurRad="55000" dist="18000" dir="5400000" algn="tl" rotWithShape="0">
+              <a:srgbClr val="000000">
+                <a:alpha val="40000"/>
+              </a:srgbClr>
+            </a:outerShdw>
           </a:effectLst>
+          <a:scene3d>
+            <a:camera prst="orthographicFront"/>
+            <a:lightRig rig="twoPt" dir="t">
+              <a:rot lat="0" lon="0" rev="7200000"/>
+            </a:lightRig>
+          </a:scene3d>
+          <a:sp3d>
+            <a:bevelT w="25400" h="19050"/>
+            <a:contourClr>
+              <a:srgbClr val="FFFFFF"/>
+            </a:contourClr>
+          </a:sp3d>
         </p:spPr>
       </p:pic>
     </p:spTree>

</xml_diff>